<commit_message>
Make progress on DJ-04
</commit_message>
<xml_diff>
--- a/lectures/DJ-03-Model-Single.pptx
+++ b/lectures/DJ-03-Model-Single.pptx
@@ -5,7 +5,7 @@
     <p:sldMasterId id="2147483660" r:id="rId1"/>
   </p:sldMasterIdLst>
   <p:notesMasterIdLst>
-    <p:notesMasterId r:id="rId15"/>
+    <p:notesMasterId r:id="rId16"/>
   </p:notesMasterIdLst>
   <p:sldIdLst>
     <p:sldId id="258" r:id="rId2"/>
@@ -19,8 +19,9 @@
     <p:sldId id="329" r:id="rId10"/>
     <p:sldId id="330" r:id="rId11"/>
     <p:sldId id="331" r:id="rId12"/>
-    <p:sldId id="332" r:id="rId13"/>
-    <p:sldId id="273" r:id="rId14"/>
+    <p:sldId id="333" r:id="rId13"/>
+    <p:sldId id="332" r:id="rId14"/>
+    <p:sldId id="273" r:id="rId15"/>
   </p:sldIdLst>
   <p:sldSz cx="12192000" cy="6858000"/>
   <p:notesSz cx="6858000" cy="9144000"/>
@@ -3834,10 +3835,10 @@
           <p:cNvPr id="10" name="Rectangle 9">
             <a:extLst>
               <a:ext uri="{FF2B5EF4-FFF2-40B4-BE49-F238E27FC236}">
-                <a16:creationId xmlns:a16="http://schemas.microsoft.com/office/drawing/2014/main" xmlns="" id="{E20EB187-900F-4AF5-813B-101456D9FD39}"/>
+                <a16:creationId xmlns="" xmlns:a16="http://schemas.microsoft.com/office/drawing/2014/main" id="{E20EB187-900F-4AF5-813B-101456D9FD39}"/>
               </a:ext>
               <a:ext uri="{C183D7F6-B498-43B3-948B-1728B52AA6E4}">
-                <adec:decorative xmlns:adec="http://schemas.microsoft.com/office/drawing/2017/decorative" xmlns="" val="1"/>
+                <adec:decorative xmlns="" xmlns:adec="http://schemas.microsoft.com/office/drawing/2017/decorative" val="1"/>
               </a:ext>
             </a:extLst>
           </p:cNvPr>
@@ -4011,10 +4012,10 @@
           <p:cNvPr id="12" name="Straight Connector 11">
             <a:extLst>
               <a:ext uri="{FF2B5EF4-FFF2-40B4-BE49-F238E27FC236}">
-                <a16:creationId xmlns:a16="http://schemas.microsoft.com/office/drawing/2014/main" xmlns="" id="{624D17C8-E9C2-48A4-AA36-D7048A6CCC41}"/>
+                <a16:creationId xmlns="" xmlns:a16="http://schemas.microsoft.com/office/drawing/2014/main" id="{624D17C8-E9C2-48A4-AA36-D7048A6CCC41}"/>
               </a:ext>
               <a:ext uri="{C183D7F6-B498-43B3-948B-1728B52AA6E4}">
-                <adec:decorative xmlns:adec="http://schemas.microsoft.com/office/drawing/2017/decorative" xmlns="" val="1"/>
+                <adec:decorative xmlns="" xmlns:adec="http://schemas.microsoft.com/office/drawing/2017/decorative" val="1"/>
               </a:ext>
             </a:extLst>
           </p:cNvPr>
@@ -5003,6 +5004,119 @@
           <a:chExt cx="0" cy="0"/>
         </a:xfrm>
       </p:grpSpPr>
+      <p:pic>
+        <p:nvPicPr>
+          <p:cNvPr id="4" name="Picture 3"/>
+          <p:cNvPicPr>
+            <a:picLocks noChangeAspect="1"/>
+          </p:cNvPicPr>
+          <p:nvPr/>
+        </p:nvPicPr>
+        <p:blipFill rotWithShape="1">
+          <a:blip r:embed="rId2">
+            <a:alphaModFix amt="50000"/>
+            <a:extLst>
+              <a:ext uri="{28A0092B-C50C-407E-A947-70E740481C1C}">
+                <a14:useLocalDpi xmlns:a14="http://schemas.microsoft.com/office/drawing/2010/main" val="0"/>
+              </a:ext>
+            </a:extLst>
+          </a:blip>
+          <a:srcRect b="2174"/>
+          <a:stretch/>
+        </p:blipFill>
+        <p:spPr>
+          <a:xfrm>
+            <a:off x="20" y="1"/>
+            <a:ext cx="12191980" cy="6857999"/>
+          </a:xfrm>
+          <a:prstGeom prst="rect">
+            <a:avLst/>
+          </a:prstGeom>
+        </p:spPr>
+      </p:pic>
+      <p:sp>
+        <p:nvSpPr>
+          <p:cNvPr id="2" name="Title 1"/>
+          <p:cNvSpPr>
+            <a:spLocks noGrp="1"/>
+          </p:cNvSpPr>
+          <p:nvPr>
+            <p:ph type="title"/>
+          </p:nvPr>
+        </p:nvSpPr>
+        <p:spPr/>
+        <p:txBody>
+          <a:bodyPr/>
+          <a:lstStyle/>
+          <a:p>
+            <a:r>
+              <a:rPr lang="en-US" dirty="0" smtClean="0"/>
+              <a:t>Demo</a:t>
+            </a:r>
+            <a:endParaRPr lang="en-US" dirty="0"/>
+          </a:p>
+        </p:txBody>
+      </p:sp>
+      <p:sp>
+        <p:nvSpPr>
+          <p:cNvPr id="3" name="Text Placeholder 2"/>
+          <p:cNvSpPr>
+            <a:spLocks noGrp="1"/>
+          </p:cNvSpPr>
+          <p:nvPr>
+            <p:ph type="body" idx="1"/>
+          </p:nvPr>
+        </p:nvSpPr>
+        <p:spPr/>
+        <p:txBody>
+          <a:bodyPr/>
+          <a:lstStyle/>
+          <a:p>
+            <a:r>
+              <a:rPr lang="en-US" dirty="0"/>
+              <a:t>https://</a:t>
+            </a:r>
+            <a:r>
+              <a:rPr lang="en-US" dirty="0" smtClean="0"/>
+              <a:t>www.dj4e.com/lectures/DJ-03-Model-Single.txt</a:t>
+            </a:r>
+            <a:endParaRPr lang="en-US" dirty="0"/>
+          </a:p>
+          <a:p>
+            <a:endParaRPr lang="en-US" dirty="0"/>
+          </a:p>
+        </p:txBody>
+      </p:sp>
+    </p:spTree>
+    <p:extLst>
+      <p:ext uri="{BB962C8B-B14F-4D97-AF65-F5344CB8AC3E}">
+        <p14:creationId xmlns:p14="http://schemas.microsoft.com/office/powerpoint/2010/main" val="495488396"/>
+      </p:ext>
+    </p:extLst>
+  </p:cSld>
+  <p:clrMapOvr>
+    <a:masterClrMapping/>
+  </p:clrMapOvr>
+</p:sld>
+</file>
+
+<file path=ppt/slides/slide13.xml><?xml version="1.0" encoding="utf-8"?>
+<p:sld xmlns:a="http://schemas.openxmlformats.org/drawingml/2006/main" xmlns:r="http://schemas.openxmlformats.org/officeDocument/2006/relationships" xmlns:p="http://schemas.openxmlformats.org/presentationml/2006/main">
+  <p:cSld>
+    <p:spTree>
+      <p:nvGrpSpPr>
+        <p:cNvPr id="1" name=""/>
+        <p:cNvGrpSpPr/>
+        <p:nvPr/>
+      </p:nvGrpSpPr>
+      <p:grpSpPr>
+        <a:xfrm>
+          <a:off x="0" y="0"/>
+          <a:ext cx="0" cy="0"/>
+          <a:chOff x="0" y="0"/>
+          <a:chExt cx="0" cy="0"/>
+        </a:xfrm>
+      </p:grpSpPr>
       <p:sp>
         <p:nvSpPr>
           <p:cNvPr id="3" name="Title 2"/>
@@ -5103,7 +5217,7 @@
 </p:sld>
 </file>
 
-<file path=ppt/slides/slide13.xml><?xml version="1.0" encoding="utf-8"?>
+<file path=ppt/slides/slide14.xml><?xml version="1.0" encoding="utf-8"?>
 <p:sld xmlns:a="http://schemas.openxmlformats.org/drawingml/2006/main" xmlns:r="http://schemas.openxmlformats.org/officeDocument/2006/relationships" xmlns:p="http://schemas.openxmlformats.org/presentationml/2006/main">
   <p:cSld>
     <p:spTree>

</xml_diff>